<commit_message>
Added sources for images used in documentation
</commit_message>
<xml_diff>
--- a/Licenta2018PoputoaiaAlexandruVasile/PrezentareLicentă.pptx
+++ b/Licenta2018PoputoaiaAlexandruVasile/PrezentareLicentă.pptx
@@ -4697,13 +4697,6 @@
               </a:rPr>
               <a:t>Universitatea ”Alexandru Ioan Cuza” Iași </a:t>
             </a:r>
-            <a:endParaRPr lang="ro-RO" dirty="0" smtClean="0">
-              <a:solidFill>
-                <a:schemeClr val="tx2">
-                  <a:lumMod val="50000"/>
-                </a:schemeClr>
-              </a:solidFill>
-            </a:endParaRPr>
           </a:p>
           <a:p>
             <a:pPr marL="457200" indent="-381000" algn="ctr">
@@ -4718,23 +4711,7 @@
                   <a:schemeClr val="tx1"/>
                 </a:solidFill>
               </a:rPr>
-              <a:t>Facultatea </a:t>
-            </a:r>
-            <a:r>
-              <a:rPr lang="ro-RO" dirty="0" smtClean="0">
-                <a:solidFill>
-                  <a:schemeClr val="tx1"/>
-                </a:solidFill>
-              </a:rPr>
-              <a:t>de </a:t>
-            </a:r>
-            <a:r>
-              <a:rPr lang="ro-RO" dirty="0" smtClean="0">
-                <a:solidFill>
-                  <a:schemeClr val="tx1"/>
-                </a:solidFill>
-              </a:rPr>
-              <a:t>Informatică</a:t>
+              <a:t>Facultatea de Informatică</a:t>
             </a:r>
           </a:p>
           <a:p>
@@ -5202,13 +5179,7 @@
           </a:bodyPr>
           <a:lstStyle/>
           <a:p>
-            <a:pPr marL="228600" lvl="0" indent="-228600" algn="l" rtl="0">
-              <a:spcBef>
-                <a:spcPts val="600"/>
-              </a:spcBef>
-              <a:spcAft>
-                <a:spcPts val="0"/>
-              </a:spcAft>
+            <a:pPr marL="228600" indent="-228600">
               <a:buClr>
                 <a:schemeClr val="dk1"/>
               </a:buClr>
@@ -5218,8 +5189,17 @@
             </a:pPr>
             <a:r>
               <a:rPr lang="ro-RO" sz="1800" dirty="0" smtClean="0"/>
-              <a:t>Motivație</a:t>
+              <a:t>Motivație și </a:t>
             </a:r>
+            <a:r>
+              <a:rPr lang="en-US" sz="1800" dirty="0" err="1" smtClean="0"/>
+              <a:t>Contribu</a:t>
+            </a:r>
+            <a:r>
+              <a:rPr lang="ro-RO" sz="1800" dirty="0" smtClean="0"/>
+              <a:t>ții</a:t>
+            </a:r>
+            <a:endParaRPr lang="ro-RO" sz="1800" dirty="0" smtClean="0"/>
           </a:p>
           <a:p>
             <a:pPr marL="228600" lvl="0" indent="-228600" algn="l" rtl="0">
@@ -5240,6 +5220,7 @@
               <a:rPr lang="ro-RO" sz="1800" dirty="0" smtClean="0"/>
               <a:t>Ce este un GPS Traker?</a:t>
             </a:r>
+            <a:endParaRPr lang="en-US" sz="1800" dirty="0" smtClean="0"/>
           </a:p>
           <a:p>
             <a:pPr marL="228600" lvl="0" indent="-228600" algn="l" rtl="0">
@@ -5258,7 +5239,11 @@
             </a:pPr>
             <a:r>
               <a:rPr lang="ro-RO" sz="1800" dirty="0" smtClean="0"/>
-              <a:t>Aplicația Android</a:t>
+              <a:t>Aplicația </a:t>
+            </a:r>
+            <a:r>
+              <a:rPr lang="ro-RO" sz="1800" dirty="0" smtClean="0"/>
+              <a:t>Android</a:t>
             </a:r>
           </a:p>
           <a:p>
@@ -6606,7 +6591,6 @@
               <a:rPr lang="ro-RO" sz="1800" dirty="0" smtClean="0"/>
               <a:t>Maparea unei traseu</a:t>
             </a:r>
-            <a:endParaRPr lang="ro-RO" sz="1800" dirty="0" smtClean="0"/>
           </a:p>
         </p:txBody>
       </p:sp>
@@ -7985,11 +7969,6 @@
               </a:rPr>
               <a:t> Înregistrare Traseu</a:t>
             </a:r>
-            <a:endParaRPr lang="ro-RO" sz="2000" dirty="0" smtClean="0">
-              <a:solidFill>
-                <a:schemeClr val="bg1"/>
-              </a:solidFill>
-            </a:endParaRPr>
           </a:p>
           <a:p>
             <a:pPr marL="0" marR="0" lvl="0" indent="0" algn="l" defTabSz="914400" rtl="0" eaLnBrk="1" fontAlgn="auto" latinLnBrk="0" hangingPunct="1">
@@ -13580,7 +13559,7 @@
         <p:spPr>
           <a:xfrm>
             <a:off x="990600" y="1276350"/>
-            <a:ext cx="4876800" cy="2667000"/>
+            <a:ext cx="7620000" cy="2667000"/>
           </a:xfrm>
           <a:prstGeom prst="rect">
             <a:avLst/>
@@ -13633,15 +13612,7 @@
                   <a:schemeClr val="bg1"/>
                 </a:solidFill>
               </a:rPr>
-              <a:t>Imbunătațire </a:t>
-            </a:r>
-            <a:r>
-              <a:rPr lang="ro-RO" sz="2000" dirty="0" smtClean="0">
-                <a:solidFill>
-                  <a:schemeClr val="bg1"/>
-                </a:solidFill>
-              </a:rPr>
-              <a:t>design, baza de date</a:t>
+              <a:t>Imbunătațire design, baza de date</a:t>
             </a:r>
           </a:p>
           <a:p>
@@ -13670,7 +13641,7 @@
                   <a:schemeClr val="bg1"/>
                 </a:solidFill>
               </a:rPr>
-              <a:t>Integrarea rețelelor </a:t>
+              <a:t>Integrarea rețelelor sociale și analizarea </a:t>
             </a:r>
             <a:r>
               <a:rPr lang="ro-RO" sz="2000" dirty="0" smtClean="0">
@@ -13678,7 +13649,31 @@
                   <a:schemeClr val="bg1"/>
                 </a:solidFill>
               </a:rPr>
-              <a:t>sociale</a:t>
+              <a:t>informa</a:t>
+            </a:r>
+            <a:r>
+              <a:rPr lang="ro-RO" sz="2000" dirty="0" smtClean="0">
+                <a:solidFill>
+                  <a:schemeClr val="bg1"/>
+                </a:solidFill>
+              </a:rPr>
+              <a:t>ț</a:t>
+            </a:r>
+            <a:r>
+              <a:rPr lang="ro-RO" sz="2000" dirty="0" smtClean="0">
+                <a:solidFill>
+                  <a:schemeClr val="bg1"/>
+                </a:solidFill>
+              </a:rPr>
+              <a:t>iilor </a:t>
+            </a:r>
+            <a:r>
+              <a:rPr lang="ro-RO" sz="2000" dirty="0" smtClean="0">
+                <a:solidFill>
+                  <a:schemeClr val="bg1"/>
+                </a:solidFill>
+              </a:rPr>
+              <a:t>în timp real</a:t>
             </a:r>
           </a:p>
           <a:p>
@@ -13709,11 +13704,6 @@
               </a:rPr>
               <a:t>Generearea a mai multor statistici</a:t>
             </a:r>
-            <a:endParaRPr lang="ro-RO" sz="2000" dirty="0" smtClean="0">
-              <a:solidFill>
-                <a:schemeClr val="bg1"/>
-              </a:solidFill>
-            </a:endParaRPr>
           </a:p>
           <a:p>
             <a:pPr marL="0" marR="0" lvl="0" indent="0" algn="l" defTabSz="914400" rtl="0" eaLnBrk="1" fontAlgn="auto" latinLnBrk="0" hangingPunct="1">
@@ -15170,6 +15160,91 @@
               <a:ea typeface="Montserrat"/>
               <a:cs typeface="Montserrat"/>
               <a:sym typeface="Montserrat"/>
+            </a:endParaRPr>
+          </a:p>
+        </p:txBody>
+      </p:sp>
+      <p:sp>
+        <p:nvSpPr>
+          <p:cNvPr id="4" name="Rectangle 3"/>
+          <p:cNvSpPr/>
+          <p:nvPr/>
+        </p:nvSpPr>
+        <p:spPr>
+          <a:xfrm>
+            <a:off x="4038600" y="4324350"/>
+            <a:ext cx="4495800" cy="215444"/>
+          </a:xfrm>
+          <a:prstGeom prst="rect">
+            <a:avLst/>
+          </a:prstGeom>
+        </p:spPr>
+        <p:txBody>
+          <a:bodyPr wrap="square">
+            <a:spAutoFit/>
+          </a:bodyPr>
+          <a:lstStyle/>
+          <a:p>
+            <a:pPr marL="457200" indent="-381000" algn="ctr">
+              <a:spcBef>
+                <a:spcPts val="600"/>
+              </a:spcBef>
+              <a:buSzPts val="2400"/>
+            </a:pPr>
+            <a:r>
+              <a:rPr lang="en-US" sz="800" dirty="0" smtClean="0">
+                <a:solidFill>
+                  <a:schemeClr val="tx2">
+                    <a:lumMod val="50000"/>
+                  </a:schemeClr>
+                </a:solidFill>
+              </a:rPr>
+              <a:t>T</a:t>
+            </a:r>
+            <a:r>
+              <a:rPr lang="ro-RO" sz="800" dirty="0" smtClean="0">
+                <a:solidFill>
+                  <a:schemeClr val="tx2">
+                    <a:lumMod val="50000"/>
+                  </a:schemeClr>
+                </a:solidFill>
+              </a:rPr>
+              <a:t>emplate</a:t>
+            </a:r>
+            <a:r>
+              <a:rPr lang="en-US" sz="800" dirty="0" smtClean="0">
+                <a:solidFill>
+                  <a:schemeClr val="tx2">
+                    <a:lumMod val="50000"/>
+                  </a:schemeClr>
+                </a:solidFill>
+              </a:rPr>
+              <a:t> </a:t>
+            </a:r>
+            <a:r>
+              <a:rPr lang="en-US" sz="800" dirty="0" err="1" smtClean="0">
+                <a:solidFill>
+                  <a:schemeClr val="tx2">
+                    <a:lumMod val="50000"/>
+                  </a:schemeClr>
+                </a:solidFill>
+              </a:rPr>
+              <a:t>prezentare</a:t>
+            </a:r>
+            <a:r>
+              <a:rPr lang="en-US" sz="800" dirty="0" smtClean="0">
+                <a:solidFill>
+                  <a:schemeClr val="tx2">
+                    <a:lumMod val="50000"/>
+                  </a:schemeClr>
+                </a:solidFill>
+              </a:rPr>
+              <a:t>: https://www.slidescarnival.com/gremio-free-presentation-template/1593</a:t>
+            </a:r>
+            <a:endParaRPr lang="en-US" sz="800" dirty="0">
+              <a:solidFill>
+                <a:schemeClr val="tx1"/>
+              </a:solidFill>
             </a:endParaRPr>
           </a:p>
         </p:txBody>

</xml_diff>